<commit_message>
adding DOI to slides, etc.
</commit_message>
<xml_diff>
--- a/TidyData - Slides.pptx
+++ b/TidyData - Slides.pptx
@@ -360,7 +360,7 @@
             <a:fld id="{3F150D65-C64D-44FB-9152-4CC2DE0C9198}" type="datetime1">
               <a:rPr lang="en-US" smtClean="0"/>
               <a:pPr/>
-              <a:t>10/9/16</a:t>
+              <a:t>10/17/16</a:t>
             </a:fld>
             <a:endParaRPr lang="en-US"/>
           </a:p>
@@ -575,7 +575,7 @@
             <a:fld id="{42635EB0-D091-417E-ACD5-D65E1C7D8524}" type="datetime1">
               <a:rPr lang="en-US" smtClean="0"/>
               <a:pPr/>
-              <a:t>10/9/16</a:t>
+              <a:t>10/17/16</a:t>
             </a:fld>
             <a:endParaRPr lang="en-US"/>
           </a:p>
@@ -752,7 +752,7 @@
             <a:fld id="{7FCA09F9-C7D6-4C52-A7E8-5101239A0BA2}" type="datetime1">
               <a:rPr lang="en-US" smtClean="0"/>
               <a:pPr/>
-              <a:t>10/9/16</a:t>
+              <a:t>10/17/16</a:t>
             </a:fld>
             <a:endParaRPr lang="en-US"/>
           </a:p>
@@ -919,7 +919,7 @@
             <a:fld id="{0FFE64A4-35FB-42B6-9183-2C0CE0E36649}" type="datetime1">
               <a:rPr lang="en-US" smtClean="0"/>
               <a:pPr/>
-              <a:t>10/9/16</a:t>
+              <a:t>10/17/16</a:t>
             </a:fld>
             <a:endParaRPr lang="en-US"/>
           </a:p>
@@ -1205,7 +1205,7 @@
             <a:fld id="{2A2683B9-6ECA-47FA-93CF-B124A0FAC208}" type="datetime1">
               <a:rPr lang="en-US" smtClean="0"/>
               <a:pPr/>
-              <a:t>10/9/16</a:t>
+              <a:t>10/17/16</a:t>
             </a:fld>
             <a:endParaRPr lang="en-US"/>
           </a:p>
@@ -1533,7 +1533,7 @@
             <a:fld id="{305FF66B-9476-4BB3-85E9-E01854F07F90}" type="datetime1">
               <a:rPr lang="en-US" smtClean="0"/>
               <a:pPr/>
-              <a:t>10/9/16</a:t>
+              <a:t>10/17/16</a:t>
             </a:fld>
             <a:endParaRPr lang="en-US"/>
           </a:p>
@@ -1960,7 +1960,7 @@
             <a:fld id="{56B23FBD-8F7D-4F85-8085-67BFDB05CB71}" type="datetime1">
               <a:rPr lang="en-US" smtClean="0"/>
               <a:pPr/>
-              <a:t>10/9/16</a:t>
+              <a:t>10/17/16</a:t>
             </a:fld>
             <a:endParaRPr lang="en-US"/>
           </a:p>
@@ -2135,7 +2135,7 @@
             <a:fld id="{465D789A-1220-4441-8676-44A034051BFD}" type="datetime1">
               <a:rPr lang="en-US" smtClean="0"/>
               <a:pPr/>
-              <a:t>10/9/16</a:t>
+              <a:t>10/17/16</a:t>
             </a:fld>
             <a:endParaRPr lang="en-US"/>
           </a:p>
@@ -2227,7 +2227,7 @@
             <a:fld id="{EF98A266-E364-4B5E-98DD-432668182E1E}" type="datetime1">
               <a:rPr lang="en-US" smtClean="0"/>
               <a:pPr/>
-              <a:t>10/9/16</a:t>
+              <a:t>10/17/16</a:t>
             </a:fld>
             <a:endParaRPr lang="en-US"/>
           </a:p>
@@ -2509,7 +2509,7 @@
             <a:fld id="{493F2040-9975-4642-A906-1DF87F8BE202}" type="datetime1">
               <a:rPr lang="en-US" smtClean="0"/>
               <a:pPr/>
-              <a:t>10/9/16</a:t>
+              <a:t>10/17/16</a:t>
             </a:fld>
             <a:endParaRPr lang="en-US"/>
           </a:p>
@@ -2810,7 +2810,7 @@
             <a:fld id="{51E52B4A-BA08-4841-AB08-A0D822ABC34D}" type="datetime1">
               <a:rPr lang="en-US" smtClean="0"/>
               <a:pPr/>
-              <a:t>10/9/16</a:t>
+              <a:t>10/17/16</a:t>
             </a:fld>
             <a:endParaRPr lang="en-US"/>
           </a:p>
@@ -3022,7 +3022,7 @@
             <a:fld id="{75D48070-6A81-47D0-9810-1540B9FEFF61}" type="datetime1">
               <a:rPr lang="en-US" smtClean="0"/>
               <a:pPr/>
-              <a:t>10/9/16</a:t>
+              <a:t>10/17/16</a:t>
             </a:fld>
             <a:endParaRPr lang="en-US"/>
           </a:p>
@@ -3621,11 +3621,7 @@
           <a:p>
             <a:r>
               <a:rPr lang="en-US" dirty="0" smtClean="0"/>
-              <a:t>Elizabeth </a:t>
-            </a:r>
-            <a:r>
-              <a:rPr lang="en-US" dirty="0" smtClean="0"/>
-              <a:t>Wickes, @</a:t>
+              <a:t>Elizabeth Wickes, @</a:t>
             </a:r>
             <a:r>
               <a:rPr lang="en-US" dirty="0" err="1" smtClean="0"/>
@@ -3646,7 +3642,6 @@
               <a:rPr lang="en-US" dirty="0" smtClean="0"/>
               <a:t> Specialist</a:t>
             </a:r>
-            <a:endParaRPr lang="en-US" dirty="0" smtClean="0"/>
           </a:p>
           <a:p>
             <a:r>
@@ -3657,6 +3652,36 @@
           </a:p>
         </p:txBody>
       </p:sp>
+      <p:pic>
+        <p:nvPicPr>
+          <p:cNvPr id="4" name="Picture 3" descr="Screen Shot 2016-10-17 at 11.33.14 AM.png"/>
+          <p:cNvPicPr>
+            <a:picLocks noChangeAspect="1"/>
+          </p:cNvPicPr>
+          <p:nvPr/>
+        </p:nvPicPr>
+        <p:blipFill>
+          <a:blip r:embed="rId2">
+            <a:extLst>
+              <a:ext uri="{28A0092B-C50C-407E-A947-70E740481C1C}">
+                <a14:useLocalDpi xmlns:a14="http://schemas.microsoft.com/office/drawing/2010/main" val="0"/>
+              </a:ext>
+            </a:extLst>
+          </a:blip>
+          <a:stretch>
+            <a:fillRect/>
+          </a:stretch>
+        </p:blipFill>
+        <p:spPr>
+          <a:xfrm>
+            <a:off x="1157305" y="2118738"/>
+            <a:ext cx="6807200" cy="787400"/>
+          </a:xfrm>
+          <a:prstGeom prst="rect">
+            <a:avLst/>
+          </a:prstGeom>
+        </p:spPr>
+      </p:pic>
     </p:spTree>
     <p:extLst>
       <p:ext uri="{BB962C8B-B14F-4D97-AF65-F5344CB8AC3E}">
@@ -3729,11 +3754,7 @@
           <a:p>
             <a:r>
               <a:rPr lang="en-US" sz="3200" dirty="0" smtClean="0"/>
-              <a:t>How </a:t>
-            </a:r>
-            <a:r>
-              <a:rPr lang="en-US" sz="3200" dirty="0" smtClean="0"/>
-              <a:t>would adding the 2014 data impact your design choices?</a:t>
+              <a:t>How would adding the 2014 data impact your design choices?</a:t>
             </a:r>
             <a:endParaRPr lang="en-US" sz="3200" dirty="0"/>
           </a:p>
@@ -5068,11 +5089,7 @@
           <a:p>
             <a:r>
               <a:rPr lang="en-US" dirty="0" smtClean="0"/>
-              <a:t>But </a:t>
-            </a:r>
-            <a:r>
-              <a:rPr lang="en-US" dirty="0" smtClean="0"/>
-              <a:t>I just want to make a graph</a:t>
+              <a:t>But I just want to make a graph</a:t>
             </a:r>
             <a:endParaRPr lang="en-US" dirty="0"/>
           </a:p>
@@ -5174,7 +5191,6 @@
               <a:rPr lang="en-US" dirty="0" smtClean="0"/>
               <a:t>library(ggplot2) # see the lack of quotes?</a:t>
             </a:r>
-            <a:endParaRPr lang="en-US" dirty="0" smtClean="0"/>
           </a:p>
         </p:txBody>
       </p:sp>
@@ -5232,11 +5248,7 @@
           <a:p>
             <a:r>
               <a:rPr lang="en-US" dirty="0" smtClean="0"/>
-              <a:t>But </a:t>
-            </a:r>
-            <a:r>
-              <a:rPr lang="en-US" dirty="0" smtClean="0"/>
-              <a:t>I just want to make a graph</a:t>
+              <a:t>But I just want to make a graph</a:t>
             </a:r>
             <a:endParaRPr lang="en-US" dirty="0"/>
           </a:p>
@@ -5314,7 +5326,6 @@
               <a:rPr lang="en-US" dirty="0" smtClean="0"/>
               <a:t>t try, just copy/paste.</a:t>
             </a:r>
-            <a:endParaRPr lang="en-US" dirty="0" smtClean="0"/>
           </a:p>
         </p:txBody>
       </p:sp>
@@ -5495,11 +5506,7 @@
           <a:p>
             <a:r>
               <a:rPr lang="en-US" dirty="0" smtClean="0"/>
-              <a:t>But I </a:t>
-            </a:r>
-            <a:r>
-              <a:rPr lang="en-US" dirty="0" smtClean="0"/>
-              <a:t>just want to make a graph</a:t>
+              <a:t>But I just want to make a graph</a:t>
             </a:r>
             <a:endParaRPr lang="en-US" dirty="0"/>
           </a:p>
@@ -5558,7 +5565,6 @@
               <a:rPr lang="en-US" sz="2800" dirty="0" smtClean="0"/>
               <a:t>))</a:t>
             </a:r>
-            <a:endParaRPr lang="en-US" sz="2800" dirty="0" smtClean="0"/>
           </a:p>
         </p:txBody>
       </p:sp>
@@ -6028,11 +6034,7 @@
           <a:p>
             <a:r>
               <a:rPr lang="en-US" dirty="0" smtClean="0"/>
-              <a:t>But I </a:t>
-            </a:r>
-            <a:r>
-              <a:rPr lang="en-US" dirty="0" smtClean="0"/>
-              <a:t>just want to make a graph</a:t>
+              <a:t>But I just want to make a graph</a:t>
             </a:r>
             <a:endParaRPr lang="en-US" dirty="0"/>
           </a:p>
@@ -6091,7 +6093,6 @@
               <a:rPr lang="en-US" sz="2800" dirty="0" smtClean="0"/>
               <a:t>))</a:t>
             </a:r>
-            <a:endParaRPr lang="en-US" sz="2800" dirty="0" smtClean="0"/>
           </a:p>
         </p:txBody>
       </p:sp>
@@ -7150,13 +7151,8 @@
           <a:p>
             <a:r>
               <a:rPr lang="en-US" dirty="0" smtClean="0"/>
-              <a:t>We’ve got several tables per sheet, formatted for </a:t>
-            </a:r>
-            <a:r>
-              <a:rPr lang="en-US" dirty="0" smtClean="0"/>
-              <a:t>readability</a:t>
-            </a:r>
-            <a:endParaRPr lang="en-US" dirty="0" smtClean="0"/>
+              <a:t>We’ve got several tables per sheet, formatted for readability</a:t>
+            </a:r>
           </a:p>
         </p:txBody>
       </p:sp>
@@ -7237,22 +7233,13 @@
           <a:p>
             <a:r>
               <a:rPr lang="en-US" sz="3200" dirty="0" smtClean="0"/>
-              <a:t>Pair up or work with </a:t>
-            </a:r>
+              <a:t>Pair up or work with 1-2 other people</a:t>
+            </a:r>
+          </a:p>
+          <a:p>
             <a:r>
               <a:rPr lang="en-US" sz="3200" dirty="0" smtClean="0"/>
-              <a:t>1-2 other people</a:t>
-            </a:r>
-            <a:endParaRPr lang="en-US" sz="3200" dirty="0" smtClean="0"/>
-          </a:p>
-          <a:p>
-            <a:r>
-              <a:rPr lang="en-US" sz="3200" dirty="0" smtClean="0"/>
-              <a:t>Play around with the </a:t>
-            </a:r>
-            <a:r>
-              <a:rPr lang="en-US" sz="3200" dirty="0" smtClean="0"/>
-              <a:t>spreadsheet</a:t>
+              <a:t>Play around with the spreadsheet</a:t>
             </a:r>
           </a:p>
           <a:p>
@@ -7260,7 +7247,6 @@
               <a:rPr lang="en-US" sz="3200" dirty="0" smtClean="0"/>
               <a:t>Think about how you can reorganize this into a single sheet</a:t>
             </a:r>
-            <a:endParaRPr lang="en-US" sz="3200" dirty="0" smtClean="0"/>
           </a:p>
           <a:p>
             <a:pPr lvl="1"/>
@@ -7268,19 +7254,13 @@
               <a:rPr lang="en-US" sz="3000" dirty="0" smtClean="0"/>
               <a:t>Determine the new column headers</a:t>
             </a:r>
-            <a:endParaRPr lang="en-US" sz="3000" dirty="0" smtClean="0"/>
           </a:p>
           <a:p>
             <a:pPr lvl="1"/>
             <a:r>
               <a:rPr lang="en-US" sz="3000" dirty="0" smtClean="0"/>
-              <a:t>Make a new tab </a:t>
-            </a:r>
-            <a:r>
-              <a:rPr lang="en-US" sz="3000" dirty="0" smtClean="0"/>
-              <a:t>and start moving the data over</a:t>
-            </a:r>
-            <a:endParaRPr lang="en-US" sz="3000" dirty="0" smtClean="0"/>
+              <a:t>Make a new tab and start moving the data over</a:t>
+            </a:r>
           </a:p>
           <a:p>
             <a:r>
@@ -7454,17 +7434,8 @@
           <a:p>
             <a:r>
               <a:rPr lang="en-US" sz="3200" dirty="0" smtClean="0"/>
-              <a:t>What </a:t>
-            </a:r>
-            <a:r>
-              <a:rPr lang="en-US" sz="3200" dirty="0" smtClean="0"/>
-              <a:t>were the column headers that you selected</a:t>
-            </a:r>
-            <a:r>
-              <a:rPr lang="en-US" sz="3200" dirty="0" smtClean="0"/>
-              <a:t>?</a:t>
-            </a:r>
-            <a:endParaRPr lang="en-US" sz="3200" dirty="0" smtClean="0"/>
+              <a:t>What were the column headers that you selected?</a:t>
+            </a:r>
           </a:p>
         </p:txBody>
       </p:sp>

</xml_diff>